<commit_message>
P6: Add code  and rename notebooks
</commit_message>
<xml_diff>
--- a/6_Classification_image_chiens/Presentation.pptx
+++ b/6_Classification_image_chiens/Presentation.pptx
@@ -5397,7 +5397,7 @@
           <a:p>
             <a:fld id="{68796EA6-6F25-4F19-87BA-7ADCC16DAEFF}" type="datetimeFigureOut">
               <a:rPr lang="en-US" smtClean="0"/>
-              <a:t>7/5/2019</a:t>
+              <a:t>12/26/2019</a:t>
             </a:fld>
             <a:endParaRPr lang="en-US" dirty="0"/>
           </a:p>
@@ -5562,7 +5562,7 @@
           <a:p>
             <a:fld id="{C39C172E-A8B5-46F6-B05C-DFA3E2E0F207}" type="datetimeFigureOut">
               <a:rPr lang="en-US" smtClean="0"/>
-              <a:t>7/5/2019</a:t>
+              <a:t>12/26/2019</a:t>
             </a:fld>
             <a:endParaRPr lang="en-US" dirty="0"/>
           </a:p>
@@ -6719,7 +6719,7 @@
             <a:fld id="{4E708F12-96AD-4ED4-8132-A78F5E42C1F5}" type="datetime1">
               <a:rPr lang="en-US" smtClean="0"/>
               <a:pPr/>
-              <a:t>7/5/2019</a:t>
+              <a:t>12/26/2019</a:t>
             </a:fld>
             <a:endParaRPr lang="en-US" dirty="0"/>
           </a:p>
@@ -6923,7 +6923,7 @@
           <a:p>
             <a:fld id="{7B7FA170-8299-44AD-AEEF-FC686C3D7804}" type="datetime1">
               <a:rPr lang="en-US" smtClean="0"/>
-              <a:t>7/5/2019</a:t>
+              <a:t>12/26/2019</a:t>
             </a:fld>
             <a:endParaRPr lang="en-US" dirty="0"/>
           </a:p>
@@ -7125,7 +7125,7 @@
           <a:p>
             <a:fld id="{2231763A-68EC-4ECD-9620-D9FE9CDDD622}" type="datetime1">
               <a:rPr lang="en-US" smtClean="0"/>
-              <a:t>7/5/2019</a:t>
+              <a:t>12/26/2019</a:t>
             </a:fld>
             <a:endParaRPr lang="en-US" dirty="0"/>
           </a:p>
@@ -7319,7 +7319,7 @@
           <a:p>
             <a:fld id="{7B98BEDD-6160-49BB-B372-861DE7DE9BA5}" type="datetime1">
               <a:rPr lang="en-US" smtClean="0"/>
-              <a:t>7/5/2019</a:t>
+              <a:t>12/26/2019</a:t>
             </a:fld>
             <a:endParaRPr lang="en-US" dirty="0"/>
           </a:p>
@@ -7554,7 +7554,7 @@
           <a:p>
             <a:fld id="{0AAE819F-B7FD-4B29-8F66-9E318144BC2A}" type="datetime1">
               <a:rPr lang="en-US" smtClean="0"/>
-              <a:t>7/5/2019</a:t>
+              <a:t>12/26/2019</a:t>
             </a:fld>
             <a:endParaRPr lang="en-US" dirty="0"/>
           </a:p>
@@ -7832,7 +7832,7 @@
           <a:p>
             <a:fld id="{D4CA159C-B6E0-4F10-9F4A-2FA57003B139}" type="datetime1">
               <a:rPr lang="en-US" smtClean="0"/>
-              <a:t>7/5/2019</a:t>
+              <a:t>12/26/2019</a:t>
             </a:fld>
             <a:endParaRPr lang="en-US" dirty="0"/>
           </a:p>
@@ -8273,7 +8273,7 @@
           <a:p>
             <a:fld id="{8170CBBB-D1D1-4386-A5E9-07F3477B78F3}" type="datetime1">
               <a:rPr lang="en-US" smtClean="0"/>
-              <a:t>7/5/2019</a:t>
+              <a:t>12/26/2019</a:t>
             </a:fld>
             <a:endParaRPr lang="en-US" dirty="0"/>
           </a:p>
@@ -8428,7 +8428,7 @@
           <a:p>
             <a:fld id="{9FA4CAD8-0EA7-4615-B69B-B2F199EF3A93}" type="datetime1">
               <a:rPr lang="en-US" smtClean="0"/>
-              <a:t>7/5/2019</a:t>
+              <a:t>12/26/2019</a:t>
             </a:fld>
             <a:endParaRPr lang="en-US" dirty="0"/>
           </a:p>
@@ -8543,7 +8543,7 @@
           <a:p>
             <a:fld id="{B9234BD7-6953-492C-921B-E68B2D7F14C8}" type="datetime1">
               <a:rPr lang="en-US" smtClean="0"/>
-              <a:t>7/5/2019</a:t>
+              <a:t>12/26/2019</a:t>
             </a:fld>
             <a:endParaRPr lang="en-US" dirty="0"/>
           </a:p>
@@ -8807,7 +8807,7 @@
           <a:p>
             <a:fld id="{35A17D9B-D4D3-4E23-88DF-2E354FA43196}" type="datetime1">
               <a:rPr lang="en-US" smtClean="0"/>
-              <a:t>7/5/2019</a:t>
+              <a:t>12/26/2019</a:t>
             </a:fld>
             <a:endParaRPr lang="en-US" dirty="0"/>
           </a:p>
@@ -9069,7 +9069,7 @@
           <a:p>
             <a:fld id="{541F67C5-D04E-4576-B61C-12ABA14BBD6C}" type="datetime1">
               <a:rPr lang="en-US" smtClean="0"/>
-              <a:t>7/5/2019</a:t>
+              <a:t>12/26/2019</a:t>
             </a:fld>
             <a:endParaRPr lang="en-US" dirty="0"/>
           </a:p>
@@ -9933,7 +9933,7 @@
             <a:fld id="{C20F09E4-6EA4-4BF3-9FC8-FF40373B88E6}" type="datetime1">
               <a:rPr lang="en-US" smtClean="0"/>
               <a:pPr/>
-              <a:t>7/5/2019</a:t>
+              <a:t>12/26/2019</a:t>
             </a:fld>
             <a:endParaRPr lang="en-US" dirty="0"/>
           </a:p>

</xml_diff>